<commit_message>
Try delete DDM < 60
图片没有什么变化
</commit_message>
<xml_diff>
--- a/1_Protocol/1_2_Planned_Analysis/1_2_2_OUTPUT/SALT.pptx
+++ b/1_Protocol/1_2_Planned_Analysis/1_2_2_OUTPUT/SALT.pptx
@@ -107,6 +107,32 @@
       </a:defRPr>
     </a:lvl9pPr>
   </p:defaultTextStyle>
+  <p:extLst>
+    <p:ext uri="{EFAFB233-063F-42B5-8137-9DF3F51BA10A}">
+      <p15:sldGuideLst xmlns:p15="http://schemas.microsoft.com/office/powerpoint/2012/main">
+        <p15:guide id="1" pos="1005" userDrawn="1">
+          <p15:clr>
+            <a:srgbClr val="A4A3A4"/>
+          </p15:clr>
+        </p15:guide>
+        <p15:guide id="2" orient="horz" pos="686" userDrawn="1">
+          <p15:clr>
+            <a:srgbClr val="A4A3A4"/>
+          </p15:clr>
+        </p15:guide>
+        <p15:guide id="3" orient="horz" pos="1049" userDrawn="1">
+          <p15:clr>
+            <a:srgbClr val="A4A3A4"/>
+          </p15:clr>
+        </p15:guide>
+        <p15:guide id="4" orient="horz" pos="2682" userDrawn="1">
+          <p15:clr>
+            <a:srgbClr val="A4A3A4"/>
+          </p15:clr>
+        </p15:guide>
+      </p15:sldGuideLst>
+    </p:ext>
+  </p:extLst>
 </p:presentation>
 </file>
 
@@ -152,7 +178,7 @@
           </a:lstStyle>
           <a:p>
             <a:r>
-              <a:rPr lang="zh-CN" altLang="en-US" smtClean="0"/>
+              <a:rPr lang="zh-CN" altLang="en-US"/>
               <a:t>单击此处编辑母版标题样式</a:t>
             </a:r>
             <a:endParaRPr lang="zh-TW" altLang="en-US"/>
@@ -217,7 +243,7 @@
           </a:lstStyle>
           <a:p>
             <a:r>
-              <a:rPr lang="zh-CN" altLang="en-US" smtClean="0"/>
+              <a:rPr lang="zh-CN" altLang="en-US"/>
               <a:t>单击此处编辑母版副标题样式</a:t>
             </a:r>
             <a:endParaRPr lang="zh-TW" altLang="en-US"/>
@@ -241,7 +267,7 @@
           <a:p>
             <a:fld id="{1C0A0098-AADB-4028-80F8-1CEEF4DE9F6F}" type="datetimeFigureOut">
               <a:rPr lang="zh-TW" altLang="en-US" smtClean="0"/>
-              <a:t>2023/2/27</a:t>
+              <a:t>2023/8/21</a:t>
             </a:fld>
             <a:endParaRPr lang="zh-TW" altLang="en-US"/>
           </a:p>
@@ -335,7 +361,7 @@
           <a:lstStyle/>
           <a:p>
             <a:r>
-              <a:rPr lang="zh-CN" altLang="en-US" smtClean="0"/>
+              <a:rPr lang="zh-CN" altLang="en-US"/>
               <a:t>单击此处编辑母版标题样式</a:t>
             </a:r>
             <a:endParaRPr lang="zh-TW" altLang="en-US"/>
@@ -359,35 +385,35 @@
           <a:p>
             <a:pPr lvl="0"/>
             <a:r>
-              <a:rPr lang="zh-CN" altLang="en-US" smtClean="0"/>
+              <a:rPr lang="zh-CN" altLang="en-US"/>
               <a:t>单击此处编辑母版文本样式</a:t>
             </a:r>
           </a:p>
           <a:p>
             <a:pPr lvl="1"/>
             <a:r>
-              <a:rPr lang="zh-CN" altLang="en-US" smtClean="0"/>
+              <a:rPr lang="zh-CN" altLang="en-US"/>
               <a:t>第二级</a:t>
             </a:r>
           </a:p>
           <a:p>
             <a:pPr lvl="2"/>
             <a:r>
-              <a:rPr lang="zh-CN" altLang="en-US" smtClean="0"/>
+              <a:rPr lang="zh-CN" altLang="en-US"/>
               <a:t>第三级</a:t>
             </a:r>
           </a:p>
           <a:p>
             <a:pPr lvl="3"/>
             <a:r>
-              <a:rPr lang="zh-CN" altLang="en-US" smtClean="0"/>
+              <a:rPr lang="zh-CN" altLang="en-US"/>
               <a:t>第四级</a:t>
             </a:r>
           </a:p>
           <a:p>
             <a:pPr lvl="4"/>
             <a:r>
-              <a:rPr lang="zh-CN" altLang="en-US" smtClean="0"/>
+              <a:rPr lang="zh-CN" altLang="en-US"/>
               <a:t>第五级</a:t>
             </a:r>
             <a:endParaRPr lang="zh-TW" altLang="en-US"/>
@@ -411,7 +437,7 @@
           <a:p>
             <a:fld id="{1C0A0098-AADB-4028-80F8-1CEEF4DE9F6F}" type="datetimeFigureOut">
               <a:rPr lang="zh-TW" altLang="en-US" smtClean="0"/>
-              <a:t>2023/2/27</a:t>
+              <a:t>2023/8/21</a:t>
             </a:fld>
             <a:endParaRPr lang="zh-TW" altLang="en-US"/>
           </a:p>
@@ -510,7 +536,7 @@
           <a:lstStyle/>
           <a:p>
             <a:r>
-              <a:rPr lang="zh-CN" altLang="en-US" smtClean="0"/>
+              <a:rPr lang="zh-CN" altLang="en-US"/>
               <a:t>单击此处编辑母版标题样式</a:t>
             </a:r>
             <a:endParaRPr lang="zh-TW" altLang="en-US"/>
@@ -539,35 +565,35 @@
           <a:p>
             <a:pPr lvl="0"/>
             <a:r>
-              <a:rPr lang="zh-CN" altLang="en-US" smtClean="0"/>
+              <a:rPr lang="zh-CN" altLang="en-US"/>
               <a:t>单击此处编辑母版文本样式</a:t>
             </a:r>
           </a:p>
           <a:p>
             <a:pPr lvl="1"/>
             <a:r>
-              <a:rPr lang="zh-CN" altLang="en-US" smtClean="0"/>
+              <a:rPr lang="zh-CN" altLang="en-US"/>
               <a:t>第二级</a:t>
             </a:r>
           </a:p>
           <a:p>
             <a:pPr lvl="2"/>
             <a:r>
-              <a:rPr lang="zh-CN" altLang="en-US" smtClean="0"/>
+              <a:rPr lang="zh-CN" altLang="en-US"/>
               <a:t>第三级</a:t>
             </a:r>
           </a:p>
           <a:p>
             <a:pPr lvl="3"/>
             <a:r>
-              <a:rPr lang="zh-CN" altLang="en-US" smtClean="0"/>
+              <a:rPr lang="zh-CN" altLang="en-US"/>
               <a:t>第四级</a:t>
             </a:r>
           </a:p>
           <a:p>
             <a:pPr lvl="4"/>
             <a:r>
-              <a:rPr lang="zh-CN" altLang="en-US" smtClean="0"/>
+              <a:rPr lang="zh-CN" altLang="en-US"/>
               <a:t>第五级</a:t>
             </a:r>
             <a:endParaRPr lang="zh-TW" altLang="en-US"/>
@@ -591,7 +617,7 @@
           <a:p>
             <a:fld id="{1C0A0098-AADB-4028-80F8-1CEEF4DE9F6F}" type="datetimeFigureOut">
               <a:rPr lang="zh-TW" altLang="en-US" smtClean="0"/>
-              <a:t>2023/2/27</a:t>
+              <a:t>2023/8/21</a:t>
             </a:fld>
             <a:endParaRPr lang="zh-TW" altLang="en-US"/>
           </a:p>
@@ -685,7 +711,7 @@
           <a:lstStyle/>
           <a:p>
             <a:r>
-              <a:rPr lang="zh-CN" altLang="en-US" smtClean="0"/>
+              <a:rPr lang="zh-CN" altLang="en-US"/>
               <a:t>单击此处编辑母版标题样式</a:t>
             </a:r>
             <a:endParaRPr lang="zh-TW" altLang="en-US"/>
@@ -709,35 +735,35 @@
           <a:p>
             <a:pPr lvl="0"/>
             <a:r>
-              <a:rPr lang="zh-CN" altLang="en-US" smtClean="0"/>
+              <a:rPr lang="zh-CN" altLang="en-US"/>
               <a:t>单击此处编辑母版文本样式</a:t>
             </a:r>
           </a:p>
           <a:p>
             <a:pPr lvl="1"/>
             <a:r>
-              <a:rPr lang="zh-CN" altLang="en-US" smtClean="0"/>
+              <a:rPr lang="zh-CN" altLang="en-US"/>
               <a:t>第二级</a:t>
             </a:r>
           </a:p>
           <a:p>
             <a:pPr lvl="2"/>
             <a:r>
-              <a:rPr lang="zh-CN" altLang="en-US" smtClean="0"/>
+              <a:rPr lang="zh-CN" altLang="en-US"/>
               <a:t>第三级</a:t>
             </a:r>
           </a:p>
           <a:p>
             <a:pPr lvl="3"/>
             <a:r>
-              <a:rPr lang="zh-CN" altLang="en-US" smtClean="0"/>
+              <a:rPr lang="zh-CN" altLang="en-US"/>
               <a:t>第四级</a:t>
             </a:r>
           </a:p>
           <a:p>
             <a:pPr lvl="4"/>
             <a:r>
-              <a:rPr lang="zh-CN" altLang="en-US" smtClean="0"/>
+              <a:rPr lang="zh-CN" altLang="en-US"/>
               <a:t>第五级</a:t>
             </a:r>
             <a:endParaRPr lang="zh-TW" altLang="en-US"/>
@@ -761,7 +787,7 @@
           <a:p>
             <a:fld id="{1C0A0098-AADB-4028-80F8-1CEEF4DE9F6F}" type="datetimeFigureOut">
               <a:rPr lang="zh-TW" altLang="en-US" smtClean="0"/>
-              <a:t>2023/2/27</a:t>
+              <a:t>2023/8/21</a:t>
             </a:fld>
             <a:endParaRPr lang="zh-TW" altLang="en-US"/>
           </a:p>
@@ -864,7 +890,7 @@
           </a:lstStyle>
           <a:p>
             <a:r>
-              <a:rPr lang="zh-CN" altLang="en-US" smtClean="0"/>
+              <a:rPr lang="zh-CN" altLang="en-US"/>
               <a:t>单击此处编辑母版标题样式</a:t>
             </a:r>
             <a:endParaRPr lang="zh-TW" altLang="en-US"/>
@@ -984,7 +1010,7 @@
           <a:p>
             <a:pPr lvl="0"/>
             <a:r>
-              <a:rPr lang="zh-CN" altLang="en-US" smtClean="0"/>
+              <a:rPr lang="zh-CN" altLang="en-US"/>
               <a:t>单击此处编辑母版文本样式</a:t>
             </a:r>
           </a:p>
@@ -1007,7 +1033,7 @@
           <a:p>
             <a:fld id="{1C0A0098-AADB-4028-80F8-1CEEF4DE9F6F}" type="datetimeFigureOut">
               <a:rPr lang="zh-TW" altLang="en-US" smtClean="0"/>
-              <a:t>2023/2/27</a:t>
+              <a:t>2023/8/21</a:t>
             </a:fld>
             <a:endParaRPr lang="zh-TW" altLang="en-US"/>
           </a:p>
@@ -1101,7 +1127,7 @@
           <a:lstStyle/>
           <a:p>
             <a:r>
-              <a:rPr lang="zh-CN" altLang="en-US" smtClean="0"/>
+              <a:rPr lang="zh-CN" altLang="en-US"/>
               <a:t>单击此处编辑母版标题样式</a:t>
             </a:r>
             <a:endParaRPr lang="zh-TW" altLang="en-US"/>
@@ -1130,35 +1156,35 @@
           <a:p>
             <a:pPr lvl="0"/>
             <a:r>
-              <a:rPr lang="zh-CN" altLang="en-US" smtClean="0"/>
+              <a:rPr lang="zh-CN" altLang="en-US"/>
               <a:t>单击此处编辑母版文本样式</a:t>
             </a:r>
           </a:p>
           <a:p>
             <a:pPr lvl="1"/>
             <a:r>
-              <a:rPr lang="zh-CN" altLang="en-US" smtClean="0"/>
+              <a:rPr lang="zh-CN" altLang="en-US"/>
               <a:t>第二级</a:t>
             </a:r>
           </a:p>
           <a:p>
             <a:pPr lvl="2"/>
             <a:r>
-              <a:rPr lang="zh-CN" altLang="en-US" smtClean="0"/>
+              <a:rPr lang="zh-CN" altLang="en-US"/>
               <a:t>第三级</a:t>
             </a:r>
           </a:p>
           <a:p>
             <a:pPr lvl="3"/>
             <a:r>
-              <a:rPr lang="zh-CN" altLang="en-US" smtClean="0"/>
+              <a:rPr lang="zh-CN" altLang="en-US"/>
               <a:t>第四级</a:t>
             </a:r>
           </a:p>
           <a:p>
             <a:pPr lvl="4"/>
             <a:r>
-              <a:rPr lang="zh-CN" altLang="en-US" smtClean="0"/>
+              <a:rPr lang="zh-CN" altLang="en-US"/>
               <a:t>第五级</a:t>
             </a:r>
             <a:endParaRPr lang="zh-TW" altLang="en-US"/>
@@ -1187,35 +1213,35 @@
           <a:p>
             <a:pPr lvl="0"/>
             <a:r>
-              <a:rPr lang="zh-CN" altLang="en-US" smtClean="0"/>
+              <a:rPr lang="zh-CN" altLang="en-US"/>
               <a:t>单击此处编辑母版文本样式</a:t>
             </a:r>
           </a:p>
           <a:p>
             <a:pPr lvl="1"/>
             <a:r>
-              <a:rPr lang="zh-CN" altLang="en-US" smtClean="0"/>
+              <a:rPr lang="zh-CN" altLang="en-US"/>
               <a:t>第二级</a:t>
             </a:r>
           </a:p>
           <a:p>
             <a:pPr lvl="2"/>
             <a:r>
-              <a:rPr lang="zh-CN" altLang="en-US" smtClean="0"/>
+              <a:rPr lang="zh-CN" altLang="en-US"/>
               <a:t>第三级</a:t>
             </a:r>
           </a:p>
           <a:p>
             <a:pPr lvl="3"/>
             <a:r>
-              <a:rPr lang="zh-CN" altLang="en-US" smtClean="0"/>
+              <a:rPr lang="zh-CN" altLang="en-US"/>
               <a:t>第四级</a:t>
             </a:r>
           </a:p>
           <a:p>
             <a:pPr lvl="4"/>
             <a:r>
-              <a:rPr lang="zh-CN" altLang="en-US" smtClean="0"/>
+              <a:rPr lang="zh-CN" altLang="en-US"/>
               <a:t>第五级</a:t>
             </a:r>
             <a:endParaRPr lang="zh-TW" altLang="en-US"/>
@@ -1239,7 +1265,7 @@
           <a:p>
             <a:fld id="{1C0A0098-AADB-4028-80F8-1CEEF4DE9F6F}" type="datetimeFigureOut">
               <a:rPr lang="zh-TW" altLang="en-US" smtClean="0"/>
-              <a:t>2023/2/27</a:t>
+              <a:t>2023/8/21</a:t>
             </a:fld>
             <a:endParaRPr lang="zh-TW" altLang="en-US"/>
           </a:p>
@@ -1338,7 +1364,7 @@
           <a:lstStyle/>
           <a:p>
             <a:r>
-              <a:rPr lang="zh-CN" altLang="en-US" smtClean="0"/>
+              <a:rPr lang="zh-CN" altLang="en-US"/>
               <a:t>单击此处编辑母版标题样式</a:t>
             </a:r>
             <a:endParaRPr lang="zh-TW" altLang="en-US"/>
@@ -1404,7 +1430,7 @@
           <a:p>
             <a:pPr lvl="0"/>
             <a:r>
-              <a:rPr lang="zh-CN" altLang="en-US" smtClean="0"/>
+              <a:rPr lang="zh-CN" altLang="en-US"/>
               <a:t>单击此处编辑母版文本样式</a:t>
             </a:r>
           </a:p>
@@ -1432,35 +1458,35 @@
           <a:p>
             <a:pPr lvl="0"/>
             <a:r>
-              <a:rPr lang="zh-CN" altLang="en-US" smtClean="0"/>
+              <a:rPr lang="zh-CN" altLang="en-US"/>
               <a:t>单击此处编辑母版文本样式</a:t>
             </a:r>
           </a:p>
           <a:p>
             <a:pPr lvl="1"/>
             <a:r>
-              <a:rPr lang="zh-CN" altLang="en-US" smtClean="0"/>
+              <a:rPr lang="zh-CN" altLang="en-US"/>
               <a:t>第二级</a:t>
             </a:r>
           </a:p>
           <a:p>
             <a:pPr lvl="2"/>
             <a:r>
-              <a:rPr lang="zh-CN" altLang="en-US" smtClean="0"/>
+              <a:rPr lang="zh-CN" altLang="en-US"/>
               <a:t>第三级</a:t>
             </a:r>
           </a:p>
           <a:p>
             <a:pPr lvl="3"/>
             <a:r>
-              <a:rPr lang="zh-CN" altLang="en-US" smtClean="0"/>
+              <a:rPr lang="zh-CN" altLang="en-US"/>
               <a:t>第四级</a:t>
             </a:r>
           </a:p>
           <a:p>
             <a:pPr lvl="4"/>
             <a:r>
-              <a:rPr lang="zh-CN" altLang="en-US" smtClean="0"/>
+              <a:rPr lang="zh-CN" altLang="en-US"/>
               <a:t>第五级</a:t>
             </a:r>
             <a:endParaRPr lang="zh-TW" altLang="en-US"/>
@@ -1526,7 +1552,7 @@
           <a:p>
             <a:pPr lvl="0"/>
             <a:r>
-              <a:rPr lang="zh-CN" altLang="en-US" smtClean="0"/>
+              <a:rPr lang="zh-CN" altLang="en-US"/>
               <a:t>单击此处编辑母版文本样式</a:t>
             </a:r>
           </a:p>
@@ -1554,35 +1580,35 @@
           <a:p>
             <a:pPr lvl="0"/>
             <a:r>
-              <a:rPr lang="zh-CN" altLang="en-US" smtClean="0"/>
+              <a:rPr lang="zh-CN" altLang="en-US"/>
               <a:t>单击此处编辑母版文本样式</a:t>
             </a:r>
           </a:p>
           <a:p>
             <a:pPr lvl="1"/>
             <a:r>
-              <a:rPr lang="zh-CN" altLang="en-US" smtClean="0"/>
+              <a:rPr lang="zh-CN" altLang="en-US"/>
               <a:t>第二级</a:t>
             </a:r>
           </a:p>
           <a:p>
             <a:pPr lvl="2"/>
             <a:r>
-              <a:rPr lang="zh-CN" altLang="en-US" smtClean="0"/>
+              <a:rPr lang="zh-CN" altLang="en-US"/>
               <a:t>第三级</a:t>
             </a:r>
           </a:p>
           <a:p>
             <a:pPr lvl="3"/>
             <a:r>
-              <a:rPr lang="zh-CN" altLang="en-US" smtClean="0"/>
+              <a:rPr lang="zh-CN" altLang="en-US"/>
               <a:t>第四级</a:t>
             </a:r>
           </a:p>
           <a:p>
             <a:pPr lvl="4"/>
             <a:r>
-              <a:rPr lang="zh-CN" altLang="en-US" smtClean="0"/>
+              <a:rPr lang="zh-CN" altLang="en-US"/>
               <a:t>第五级</a:t>
             </a:r>
             <a:endParaRPr lang="zh-TW" altLang="en-US"/>
@@ -1606,7 +1632,7 @@
           <a:p>
             <a:fld id="{1C0A0098-AADB-4028-80F8-1CEEF4DE9F6F}" type="datetimeFigureOut">
               <a:rPr lang="zh-TW" altLang="en-US" smtClean="0"/>
-              <a:t>2023/2/27</a:t>
+              <a:t>2023/8/21</a:t>
             </a:fld>
             <a:endParaRPr lang="zh-TW" altLang="en-US"/>
           </a:p>
@@ -1700,7 +1726,7 @@
           <a:lstStyle/>
           <a:p>
             <a:r>
-              <a:rPr lang="zh-CN" altLang="en-US" smtClean="0"/>
+              <a:rPr lang="zh-CN" altLang="en-US"/>
               <a:t>单击此处编辑母版标题样式</a:t>
             </a:r>
             <a:endParaRPr lang="zh-TW" altLang="en-US"/>
@@ -1724,7 +1750,7 @@
           <a:p>
             <a:fld id="{1C0A0098-AADB-4028-80F8-1CEEF4DE9F6F}" type="datetimeFigureOut">
               <a:rPr lang="zh-TW" altLang="en-US" smtClean="0"/>
-              <a:t>2023/2/27</a:t>
+              <a:t>2023/8/21</a:t>
             </a:fld>
             <a:endParaRPr lang="zh-TW" altLang="en-US"/>
           </a:p>
@@ -1819,7 +1845,7 @@
           <a:p>
             <a:fld id="{1C0A0098-AADB-4028-80F8-1CEEF4DE9F6F}" type="datetimeFigureOut">
               <a:rPr lang="zh-TW" altLang="en-US" smtClean="0"/>
-              <a:t>2023/2/27</a:t>
+              <a:t>2023/8/21</a:t>
             </a:fld>
             <a:endParaRPr lang="zh-TW" altLang="en-US"/>
           </a:p>
@@ -1922,7 +1948,7 @@
           </a:lstStyle>
           <a:p>
             <a:r>
-              <a:rPr lang="zh-CN" altLang="en-US" smtClean="0"/>
+              <a:rPr lang="zh-CN" altLang="en-US"/>
               <a:t>单击此处编辑母版标题样式</a:t>
             </a:r>
             <a:endParaRPr lang="zh-TW" altLang="en-US"/>
@@ -1979,35 +2005,35 @@
           <a:p>
             <a:pPr lvl="0"/>
             <a:r>
-              <a:rPr lang="zh-CN" altLang="en-US" smtClean="0"/>
+              <a:rPr lang="zh-CN" altLang="en-US"/>
               <a:t>单击此处编辑母版文本样式</a:t>
             </a:r>
           </a:p>
           <a:p>
             <a:pPr lvl="1"/>
             <a:r>
-              <a:rPr lang="zh-CN" altLang="en-US" smtClean="0"/>
+              <a:rPr lang="zh-CN" altLang="en-US"/>
               <a:t>第二级</a:t>
             </a:r>
           </a:p>
           <a:p>
             <a:pPr lvl="2"/>
             <a:r>
-              <a:rPr lang="zh-CN" altLang="en-US" smtClean="0"/>
+              <a:rPr lang="zh-CN" altLang="en-US"/>
               <a:t>第三级</a:t>
             </a:r>
           </a:p>
           <a:p>
             <a:pPr lvl="3"/>
             <a:r>
-              <a:rPr lang="zh-CN" altLang="en-US" smtClean="0"/>
+              <a:rPr lang="zh-CN" altLang="en-US"/>
               <a:t>第四级</a:t>
             </a:r>
           </a:p>
           <a:p>
             <a:pPr lvl="4"/>
             <a:r>
-              <a:rPr lang="zh-CN" altLang="en-US" smtClean="0"/>
+              <a:rPr lang="zh-CN" altLang="en-US"/>
               <a:t>第五级</a:t>
             </a:r>
             <a:endParaRPr lang="zh-TW" altLang="en-US"/>
@@ -2073,7 +2099,7 @@
           <a:p>
             <a:pPr lvl="0"/>
             <a:r>
-              <a:rPr lang="zh-CN" altLang="en-US" smtClean="0"/>
+              <a:rPr lang="zh-CN" altLang="en-US"/>
               <a:t>单击此处编辑母版文本样式</a:t>
             </a:r>
           </a:p>
@@ -2096,7 +2122,7 @@
           <a:p>
             <a:fld id="{1C0A0098-AADB-4028-80F8-1CEEF4DE9F6F}" type="datetimeFigureOut">
               <a:rPr lang="zh-TW" altLang="en-US" smtClean="0"/>
-              <a:t>2023/2/27</a:t>
+              <a:t>2023/8/21</a:t>
             </a:fld>
             <a:endParaRPr lang="zh-TW" altLang="en-US"/>
           </a:p>
@@ -2199,7 +2225,7 @@
           </a:lstStyle>
           <a:p>
             <a:r>
-              <a:rPr lang="zh-CN" altLang="en-US" smtClean="0"/>
+              <a:rPr lang="zh-CN" altLang="en-US"/>
               <a:t>单击此处编辑母版标题样式</a:t>
             </a:r>
             <a:endParaRPr lang="zh-TW" altLang="en-US"/>
@@ -2326,7 +2352,7 @@
           <a:p>
             <a:pPr lvl="0"/>
             <a:r>
-              <a:rPr lang="zh-CN" altLang="en-US" smtClean="0"/>
+              <a:rPr lang="zh-CN" altLang="en-US"/>
               <a:t>单击此处编辑母版文本样式</a:t>
             </a:r>
           </a:p>
@@ -2349,7 +2375,7 @@
           <a:p>
             <a:fld id="{1C0A0098-AADB-4028-80F8-1CEEF4DE9F6F}" type="datetimeFigureOut">
               <a:rPr lang="zh-TW" altLang="en-US" smtClean="0"/>
-              <a:t>2023/2/27</a:t>
+              <a:t>2023/8/21</a:t>
             </a:fld>
             <a:endParaRPr lang="zh-TW" altLang="en-US"/>
           </a:p>
@@ -2458,7 +2484,7 @@
           <a:lstStyle/>
           <a:p>
             <a:r>
-              <a:rPr lang="zh-CN" altLang="en-US" smtClean="0"/>
+              <a:rPr lang="zh-CN" altLang="en-US"/>
               <a:t>单击此处编辑母版标题样式</a:t>
             </a:r>
             <a:endParaRPr lang="zh-TW" altLang="en-US"/>
@@ -2492,35 +2518,35 @@
           <a:p>
             <a:pPr lvl="0"/>
             <a:r>
-              <a:rPr lang="zh-CN" altLang="en-US" smtClean="0"/>
+              <a:rPr lang="zh-CN" altLang="en-US"/>
               <a:t>单击此处编辑母版文本样式</a:t>
             </a:r>
           </a:p>
           <a:p>
             <a:pPr lvl="1"/>
             <a:r>
-              <a:rPr lang="zh-CN" altLang="en-US" smtClean="0"/>
+              <a:rPr lang="zh-CN" altLang="en-US"/>
               <a:t>第二级</a:t>
             </a:r>
           </a:p>
           <a:p>
             <a:pPr lvl="2"/>
             <a:r>
-              <a:rPr lang="zh-CN" altLang="en-US" smtClean="0"/>
+              <a:rPr lang="zh-CN" altLang="en-US"/>
               <a:t>第三级</a:t>
             </a:r>
           </a:p>
           <a:p>
             <a:pPr lvl="3"/>
             <a:r>
-              <a:rPr lang="zh-CN" altLang="en-US" smtClean="0"/>
+              <a:rPr lang="zh-CN" altLang="en-US"/>
               <a:t>第四级</a:t>
             </a:r>
           </a:p>
           <a:p>
             <a:pPr lvl="4"/>
             <a:r>
-              <a:rPr lang="zh-CN" altLang="en-US" smtClean="0"/>
+              <a:rPr lang="zh-CN" altLang="en-US"/>
               <a:t>第五级</a:t>
             </a:r>
             <a:endParaRPr lang="zh-TW" altLang="en-US"/>
@@ -2562,7 +2588,7 @@
           <a:p>
             <a:fld id="{1C0A0098-AADB-4028-80F8-1CEEF4DE9F6F}" type="datetimeFigureOut">
               <a:rPr lang="zh-TW" altLang="en-US" smtClean="0"/>
-              <a:t>2023/2/27</a:t>
+              <a:t>2023/8/21</a:t>
             </a:fld>
             <a:endParaRPr lang="zh-TW" altLang="en-US"/>
           </a:p>
@@ -3040,7 +3066,7 @@
           <a:p>
             <a:pPr algn="ctr"/>
             <a:r>
-              <a:rPr lang="en-US" altLang="zh-TW" sz="3000" b="1" dirty="0" smtClean="0">
+              <a:rPr lang="en-US" altLang="zh-TW" sz="3000" b="1" dirty="0">
                 <a:solidFill>
                   <a:schemeClr val="tx1"/>
                 </a:solidFill>
@@ -3359,7 +3385,7 @@
               <a:lstStyle/>
               <a:p>
                 <a:r>
-                  <a:rPr lang="en-US" altLang="zh-TW" sz="2400" dirty="0" smtClean="0">
+                  <a:rPr lang="en-US" altLang="zh-TW" sz="2400" dirty="0">
                     <a:solidFill>
                       <a:schemeClr val="bg1"/>
                     </a:solidFill>
@@ -3401,7 +3427,7 @@
               <a:lstStyle/>
               <a:p>
                 <a:r>
-                  <a:rPr lang="en-US" altLang="zh-TW" sz="2400" dirty="0" smtClean="0">
+                  <a:rPr lang="en-US" altLang="zh-TW" sz="2400" dirty="0">
                     <a:solidFill>
                       <a:schemeClr val="bg1"/>
                     </a:solidFill>
@@ -3443,7 +3469,7 @@
               <a:lstStyle/>
               <a:p>
                 <a:r>
-                  <a:rPr lang="en-US" altLang="zh-TW" sz="2400" dirty="0" smtClean="0">
+                  <a:rPr lang="en-US" altLang="zh-TW" sz="2400" dirty="0">
                     <a:solidFill>
                       <a:schemeClr val="bg1"/>
                     </a:solidFill>
@@ -3500,7 +3526,7 @@
               <a:lstStyle/>
               <a:p>
                 <a:r>
-                  <a:rPr lang="en-US" altLang="zh-CN" sz="2400" dirty="0" smtClean="0">
+                  <a:rPr lang="en-US" altLang="zh-CN" sz="2400" dirty="0">
                     <a:solidFill>
                       <a:schemeClr val="bg1"/>
                     </a:solidFill>
@@ -3542,7 +3568,7 @@
               <a:lstStyle/>
               <a:p>
                 <a:r>
-                  <a:rPr lang="en-US" altLang="zh-CN" sz="2400" dirty="0" smtClean="0">
+                  <a:rPr lang="en-US" altLang="zh-CN" sz="2400" dirty="0">
                     <a:solidFill>
                       <a:schemeClr val="bg1"/>
                     </a:solidFill>
@@ -3584,7 +3610,7 @@
               <a:lstStyle/>
               <a:p>
                 <a:r>
-                  <a:rPr lang="en-US" altLang="zh-CN" sz="2400" dirty="0" smtClean="0">
+                  <a:rPr lang="en-US" altLang="zh-CN" sz="2400" dirty="0">
                     <a:solidFill>
                       <a:schemeClr val="bg1"/>
                     </a:solidFill>
@@ -3648,16 +3674,26 @@
           <a:p>
             <a:pPr algn="ctr"/>
             <a:r>
-              <a:rPr lang="en-US" altLang="zh-TW" sz="3600" b="1" dirty="0" smtClean="0">
+              <a:rPr lang="en-US" altLang="zh-CN" sz="3300" b="1" dirty="0">
                 <a:solidFill>
                   <a:schemeClr val="tx1"/>
                 </a:solidFill>
                 <a:latin typeface="Times New Roman" panose="02020603050405020304" pitchFamily="18" charset="0"/>
                 <a:cs typeface="Times New Roman" panose="02020603050405020304" pitchFamily="18" charset="0"/>
               </a:rPr>
-              <a:t>Leaning stage</a:t>
-            </a:r>
-            <a:endParaRPr lang="zh-TW" altLang="en-US" sz="3600" b="1" dirty="0">
+              <a:t>Instruction</a:t>
+            </a:r>
+            <a:r>
+              <a:rPr lang="en-US" altLang="zh-TW" sz="3300" b="1" dirty="0">
+                <a:solidFill>
+                  <a:schemeClr val="tx1"/>
+                </a:solidFill>
+                <a:latin typeface="Times New Roman" panose="02020603050405020304" pitchFamily="18" charset="0"/>
+                <a:cs typeface="Times New Roman" panose="02020603050405020304" pitchFamily="18" charset="0"/>
+              </a:rPr>
+              <a:t> Stage</a:t>
+            </a:r>
+            <a:endParaRPr lang="zh-TW" altLang="en-US" sz="3300" b="1" dirty="0">
               <a:solidFill>
                 <a:schemeClr val="tx1"/>
               </a:solidFill>
@@ -3808,20 +3844,20 @@
                 <a:lstStyle/>
                 <a:p>
                   <a:r>
-                    <a:rPr lang="en-US" altLang="zh-TW" sz="1400" dirty="0" smtClean="0">
+                    <a:rPr lang="en-US" altLang="zh-TW" sz="1400" dirty="0">
                       <a:latin typeface="Times New Roman" panose="02020603050405020304" pitchFamily="18" charset="0"/>
                       <a:cs typeface="Times New Roman" panose="02020603050405020304" pitchFamily="18" charset="0"/>
                     </a:rPr>
                     <a:t>500</a:t>
                   </a:r>
                   <a:r>
-                    <a:rPr lang="en-US" altLang="zh-CN" sz="1400" dirty="0" smtClean="0">
+                    <a:rPr lang="en-US" altLang="zh-CN" sz="1400" dirty="0">
                       <a:latin typeface="Times New Roman" panose="02020603050405020304" pitchFamily="18" charset="0"/>
                       <a:cs typeface="Times New Roman" panose="02020603050405020304" pitchFamily="18" charset="0"/>
                     </a:rPr>
                     <a:t>ms</a:t>
                   </a:r>
-                  <a:endParaRPr lang="en-US" altLang="zh-TW" sz="1400" dirty="0" smtClean="0">
+                  <a:endParaRPr lang="en-US" altLang="zh-TW" sz="1400" dirty="0">
                     <a:latin typeface="Times New Roman" panose="02020603050405020304" pitchFamily="18" charset="0"/>
                     <a:cs typeface="Times New Roman" panose="02020603050405020304" pitchFamily="18" charset="0"/>
                   </a:endParaRPr>
@@ -3916,7 +3952,7 @@
                   <a:lstStyle/>
                   <a:p>
                     <a:r>
-                      <a:rPr lang="en-US" altLang="zh-TW" sz="2800" dirty="0" smtClean="0">
+                      <a:rPr lang="en-US" altLang="zh-TW" sz="2800" dirty="0">
                         <a:solidFill>
                           <a:schemeClr val="bg1"/>
                         </a:solidFill>
@@ -4039,7 +4075,7 @@
                   <a:lstStyle/>
                   <a:p>
                     <a:r>
-                      <a:rPr lang="en-US" altLang="zh-TW" sz="2800" dirty="0" smtClean="0">
+                      <a:rPr lang="en-US" altLang="zh-TW" sz="2800" dirty="0">
                         <a:solidFill>
                           <a:schemeClr val="bg1"/>
                         </a:solidFill>
@@ -4133,7 +4169,7 @@
                 <a:lstStyle/>
                 <a:p>
                   <a:r>
-                    <a:rPr lang="en-US" altLang="zh-CN" dirty="0" smtClean="0">
+                    <a:rPr lang="en-US" altLang="zh-CN" dirty="0">
                       <a:solidFill>
                         <a:schemeClr val="bg1"/>
                       </a:solidFill>
@@ -4179,23 +4215,16 @@
                       <a:latin typeface="Times New Roman" panose="02020603050405020304" pitchFamily="18" charset="0"/>
                       <a:cs typeface="Times New Roman" panose="02020603050405020304" pitchFamily="18" charset="0"/>
                     </a:rPr>
-                    <a:t>1</a:t>
+                    <a:t>100</a:t>
                   </a:r>
                   <a:r>
-                    <a:rPr lang="en-US" altLang="zh-TW" sz="1400" dirty="0" smtClean="0">
-                      <a:latin typeface="Times New Roman" panose="02020603050405020304" pitchFamily="18" charset="0"/>
-                      <a:cs typeface="Times New Roman" panose="02020603050405020304" pitchFamily="18" charset="0"/>
-                    </a:rPr>
-                    <a:t>00</a:t>
-                  </a:r>
-                  <a:r>
-                    <a:rPr lang="en-US" altLang="zh-CN" sz="1400" dirty="0" smtClean="0">
+                    <a:rPr lang="en-US" altLang="zh-CN" sz="1400" dirty="0">
                       <a:latin typeface="Times New Roman" panose="02020603050405020304" pitchFamily="18" charset="0"/>
                       <a:cs typeface="Times New Roman" panose="02020603050405020304" pitchFamily="18" charset="0"/>
                     </a:rPr>
                     <a:t>ms</a:t>
                   </a:r>
-                  <a:endParaRPr lang="en-US" altLang="zh-TW" sz="1400" dirty="0" smtClean="0">
+                  <a:endParaRPr lang="en-US" altLang="zh-TW" sz="1400" dirty="0">
                     <a:latin typeface="Times New Roman" panose="02020603050405020304" pitchFamily="18" charset="0"/>
                     <a:cs typeface="Times New Roman" panose="02020603050405020304" pitchFamily="18" charset="0"/>
                   </a:endParaRPr>
@@ -4240,7 +4269,7 @@
                 <a:lstStyle/>
                 <a:p>
                   <a:r>
-                    <a:rPr lang="en-US" altLang="zh-TW" sz="1400" dirty="0" smtClean="0">
+                    <a:rPr lang="en-US" altLang="zh-TW" sz="1400" dirty="0">
                       <a:latin typeface="Times New Roman" panose="02020603050405020304" pitchFamily="18" charset="0"/>
                       <a:cs typeface="Times New Roman" panose="02020603050405020304" pitchFamily="18" charset="0"/>
                     </a:rPr>
@@ -4403,7 +4432,7 @@
                   <a:lstStyle/>
                   <a:p>
                     <a:r>
-                      <a:rPr lang="en-US" altLang="zh-CN" dirty="0" smtClean="0">
+                      <a:rPr lang="en-US" altLang="zh-CN" dirty="0">
                         <a:solidFill>
                           <a:schemeClr val="bg1"/>
                         </a:solidFill>
@@ -4446,20 +4475,20 @@
                 <a:lstStyle/>
                 <a:p>
                   <a:r>
-                    <a:rPr lang="en-US" altLang="zh-TW" sz="1400" dirty="0" smtClean="0">
+                    <a:rPr lang="en-US" altLang="zh-TW" sz="1400" dirty="0">
                       <a:latin typeface="Times New Roman" panose="02020603050405020304" pitchFamily="18" charset="0"/>
                       <a:cs typeface="Times New Roman" panose="02020603050405020304" pitchFamily="18" charset="0"/>
                     </a:rPr>
                     <a:t>500</a:t>
                   </a:r>
                   <a:r>
-                    <a:rPr lang="en-US" altLang="zh-CN" sz="1400" dirty="0" smtClean="0">
+                    <a:rPr lang="en-US" altLang="zh-CN" sz="1400" dirty="0">
                       <a:latin typeface="Times New Roman" panose="02020603050405020304" pitchFamily="18" charset="0"/>
                       <a:cs typeface="Times New Roman" panose="02020603050405020304" pitchFamily="18" charset="0"/>
                     </a:rPr>
                     <a:t>ms</a:t>
                   </a:r>
-                  <a:endParaRPr lang="en-US" altLang="zh-TW" sz="1400" dirty="0" smtClean="0">
+                  <a:endParaRPr lang="en-US" altLang="zh-TW" sz="1400" dirty="0">
                     <a:latin typeface="Times New Roman" panose="02020603050405020304" pitchFamily="18" charset="0"/>
                     <a:cs typeface="Times New Roman" panose="02020603050405020304" pitchFamily="18" charset="0"/>
                   </a:endParaRPr>
@@ -4620,20 +4649,20 @@
                 <a:lstStyle/>
                 <a:p>
                   <a:r>
-                    <a:rPr lang="en-US" altLang="zh-TW" sz="1400" dirty="0" smtClean="0">
+                    <a:rPr lang="en-US" altLang="zh-TW" sz="1400" dirty="0">
                       <a:latin typeface="Times New Roman" panose="02020603050405020304" pitchFamily="18" charset="0"/>
                       <a:cs typeface="Times New Roman" panose="02020603050405020304" pitchFamily="18" charset="0"/>
                     </a:rPr>
                     <a:t>500</a:t>
                   </a:r>
                   <a:r>
-                    <a:rPr lang="en-US" altLang="zh-CN" sz="1400" dirty="0" smtClean="0">
+                    <a:rPr lang="en-US" altLang="zh-CN" sz="1400" dirty="0">
                       <a:latin typeface="Times New Roman" panose="02020603050405020304" pitchFamily="18" charset="0"/>
                       <a:cs typeface="Times New Roman" panose="02020603050405020304" pitchFamily="18" charset="0"/>
                     </a:rPr>
                     <a:t>ms</a:t>
                   </a:r>
-                  <a:endParaRPr lang="en-US" altLang="zh-TW" sz="1400" dirty="0" smtClean="0">
+                  <a:endParaRPr lang="en-US" altLang="zh-TW" sz="1400" dirty="0">
                     <a:latin typeface="Times New Roman" panose="02020603050405020304" pitchFamily="18" charset="0"/>
                     <a:cs typeface="Times New Roman" panose="02020603050405020304" pitchFamily="18" charset="0"/>
                   </a:endParaRPr>
@@ -4728,7 +4757,7 @@
                   <a:lstStyle/>
                   <a:p>
                     <a:r>
-                      <a:rPr lang="en-US" altLang="zh-TW" sz="2800" dirty="0" smtClean="0">
+                      <a:rPr lang="en-US" altLang="zh-TW" sz="2800" dirty="0">
                         <a:solidFill>
                           <a:schemeClr val="bg1"/>
                         </a:solidFill>
@@ -4851,7 +4880,7 @@
                   <a:lstStyle/>
                   <a:p>
                     <a:r>
-                      <a:rPr lang="en-US" altLang="zh-TW" sz="2800" dirty="0" smtClean="0">
+                      <a:rPr lang="en-US" altLang="zh-TW" sz="2800" dirty="0">
                         <a:solidFill>
                           <a:schemeClr val="bg1"/>
                         </a:solidFill>
@@ -4945,7 +4974,7 @@
                 <a:lstStyle/>
                 <a:p>
                   <a:r>
-                    <a:rPr lang="en-US" altLang="zh-CN" dirty="0" smtClean="0">
+                    <a:rPr lang="en-US" altLang="zh-CN" dirty="0">
                       <a:solidFill>
                         <a:schemeClr val="bg1"/>
                       </a:solidFill>
@@ -4991,23 +5020,16 @@
                       <a:latin typeface="Times New Roman" panose="02020603050405020304" pitchFamily="18" charset="0"/>
                       <a:cs typeface="Times New Roman" panose="02020603050405020304" pitchFamily="18" charset="0"/>
                     </a:rPr>
-                    <a:t>1</a:t>
+                    <a:t>100</a:t>
                   </a:r>
                   <a:r>
-                    <a:rPr lang="en-US" altLang="zh-TW" sz="1400" dirty="0" smtClean="0">
-                      <a:latin typeface="Times New Roman" panose="02020603050405020304" pitchFamily="18" charset="0"/>
-                      <a:cs typeface="Times New Roman" panose="02020603050405020304" pitchFamily="18" charset="0"/>
-                    </a:rPr>
-                    <a:t>00</a:t>
-                  </a:r>
-                  <a:r>
-                    <a:rPr lang="en-US" altLang="zh-CN" sz="1400" dirty="0" smtClean="0">
+                    <a:rPr lang="en-US" altLang="zh-CN" sz="1400" dirty="0">
                       <a:latin typeface="Times New Roman" panose="02020603050405020304" pitchFamily="18" charset="0"/>
                       <a:cs typeface="Times New Roman" panose="02020603050405020304" pitchFamily="18" charset="0"/>
                     </a:rPr>
                     <a:t>ms</a:t>
                   </a:r>
-                  <a:endParaRPr lang="en-US" altLang="zh-TW" sz="1400" dirty="0" smtClean="0">
+                  <a:endParaRPr lang="en-US" altLang="zh-TW" sz="1400" dirty="0">
                     <a:latin typeface="Times New Roman" panose="02020603050405020304" pitchFamily="18" charset="0"/>
                     <a:cs typeface="Times New Roman" panose="02020603050405020304" pitchFamily="18" charset="0"/>
                   </a:endParaRPr>
@@ -5052,7 +5074,7 @@
                 <a:lstStyle/>
                 <a:p>
                   <a:r>
-                    <a:rPr lang="en-US" altLang="zh-TW" sz="1400" dirty="0" smtClean="0">
+                    <a:rPr lang="en-US" altLang="zh-TW" sz="1400" dirty="0">
                       <a:latin typeface="Times New Roman" panose="02020603050405020304" pitchFamily="18" charset="0"/>
                       <a:cs typeface="Times New Roman" panose="02020603050405020304" pitchFamily="18" charset="0"/>
                     </a:rPr>
@@ -5201,20 +5223,20 @@
                 <a:lstStyle/>
                 <a:p>
                   <a:r>
-                    <a:rPr lang="en-US" altLang="zh-TW" sz="1400" dirty="0" smtClean="0">
+                    <a:rPr lang="en-US" altLang="zh-TW" sz="1400" dirty="0">
                       <a:latin typeface="Times New Roman" panose="02020603050405020304" pitchFamily="18" charset="0"/>
                       <a:cs typeface="Times New Roman" panose="02020603050405020304" pitchFamily="18" charset="0"/>
                     </a:rPr>
                     <a:t>ITI 0 ~ 500</a:t>
                   </a:r>
                   <a:r>
-                    <a:rPr lang="en-US" altLang="zh-CN" sz="1400" dirty="0" smtClean="0">
+                    <a:rPr lang="en-US" altLang="zh-CN" sz="1400" dirty="0">
                       <a:latin typeface="Times New Roman" panose="02020603050405020304" pitchFamily="18" charset="0"/>
                       <a:cs typeface="Times New Roman" panose="02020603050405020304" pitchFamily="18" charset="0"/>
                     </a:rPr>
                     <a:t>ms</a:t>
                   </a:r>
-                  <a:endParaRPr lang="en-US" altLang="zh-TW" sz="1400" dirty="0" smtClean="0">
+                  <a:endParaRPr lang="en-US" altLang="zh-TW" sz="1400" dirty="0">
                     <a:latin typeface="Times New Roman" panose="02020603050405020304" pitchFamily="18" charset="0"/>
                     <a:cs typeface="Times New Roman" panose="02020603050405020304" pitchFamily="18" charset="0"/>
                   </a:endParaRPr>
@@ -5353,11 +5375,11 @@
           <a:p>
             <a:pPr algn="ctr"/>
             <a:r>
-              <a:rPr lang="en-US" altLang="zh-TW" sz="3600" b="1" dirty="0" smtClean="0">
+              <a:rPr lang="en-US" altLang="zh-TW" sz="3600" b="1" dirty="0">
                 <a:latin typeface="Times New Roman" panose="02020603050405020304" pitchFamily="18" charset="0"/>
                 <a:cs typeface="Times New Roman" panose="02020603050405020304" pitchFamily="18" charset="0"/>
               </a:rPr>
-              <a:t>Practice trials</a:t>
+              <a:t>Practice Trials</a:t>
             </a:r>
             <a:endParaRPr lang="zh-TW" altLang="en-US" sz="3600" b="1" dirty="0">
               <a:latin typeface="Times New Roman" panose="02020603050405020304" pitchFamily="18" charset="0"/>
@@ -5409,11 +5431,11 @@
           <a:p>
             <a:pPr algn="ctr"/>
             <a:r>
-              <a:rPr lang="en-US" altLang="zh-TW" sz="3600" b="1" dirty="0" smtClean="0">
+              <a:rPr lang="en-US" altLang="zh-TW" sz="3600" b="1" dirty="0">
                 <a:latin typeface="Times New Roman" panose="02020603050405020304" pitchFamily="18" charset="0"/>
                 <a:cs typeface="Times New Roman" panose="02020603050405020304" pitchFamily="18" charset="0"/>
               </a:rPr>
-              <a:t>Formal trials</a:t>
+              <a:t>Formal Trials</a:t>
             </a:r>
             <a:endParaRPr lang="zh-TW" altLang="en-US" sz="3600" b="1" dirty="0">
               <a:latin typeface="Times New Roman" panose="02020603050405020304" pitchFamily="18" charset="0"/>
@@ -5465,14 +5487,14 @@
           <a:p>
             <a:pPr algn="ctr"/>
             <a:r>
-              <a:rPr lang="en-US" altLang="zh-TW" sz="3600" b="1" dirty="0" smtClean="0">
+              <a:rPr lang="en-US" altLang="zh-TW" sz="3600" b="1" dirty="0">
                 <a:solidFill>
                   <a:schemeClr val="tx1"/>
                 </a:solidFill>
                 <a:latin typeface="Times New Roman" panose="02020603050405020304" pitchFamily="18" charset="0"/>
                 <a:cs typeface="Times New Roman" panose="02020603050405020304" pitchFamily="18" charset="0"/>
               </a:rPr>
-              <a:t>Matching task</a:t>
+              <a:t>Matching Task</a:t>
             </a:r>
             <a:endParaRPr lang="zh-TW" altLang="en-US" sz="3600" b="1" dirty="0">
               <a:solidFill>
@@ -5514,139 +5536,95 @@
           <a:chExt cx="0" cy="0"/>
         </a:xfrm>
       </p:grpSpPr>
-      <p:grpSp>
-        <p:nvGrpSpPr>
-          <p:cNvPr id="7" name="组合 6"/>
-          <p:cNvGrpSpPr/>
+      <p:pic>
+        <p:nvPicPr>
+          <p:cNvPr id="6" name="图片 5"/>
+          <p:cNvPicPr>
+            <a:picLocks noChangeAspect="1"/>
+          </p:cNvPicPr>
           <p:nvPr/>
-        </p:nvGrpSpPr>
-        <p:grpSpPr>
+        </p:nvPicPr>
+        <p:blipFill rotWithShape="1">
+          <a:blip r:embed="rId2">
+            <a:extLst>
+              <a:ext uri="{28A0092B-C50C-407E-A947-70E740481C1C}">
+                <a14:useLocalDpi xmlns:a14="http://schemas.microsoft.com/office/drawing/2010/main" val="0"/>
+              </a:ext>
+            </a:extLst>
+          </a:blip>
+          <a:srcRect l="9338" t="35874" r="63606" b="21045"/>
+          <a:stretch/>
+        </p:blipFill>
+        <p:spPr>
           <a:xfrm>
-            <a:off x="-883149" y="-110903"/>
-            <a:ext cx="13547196" cy="6321204"/>
-            <a:chOff x="-201828" y="295385"/>
-            <a:chExt cx="12336954" cy="5756497"/>
+            <a:off x="-16934" y="2817817"/>
+            <a:ext cx="3225245" cy="2888722"/>
           </a:xfrm>
-        </p:grpSpPr>
-        <p:pic>
-          <p:nvPicPr>
-            <p:cNvPr id="3" name="图片 2"/>
-            <p:cNvPicPr>
-              <a:picLocks noChangeAspect="1"/>
-            </p:cNvPicPr>
-            <p:nvPr/>
-          </p:nvPicPr>
-          <p:blipFill>
-            <a:blip r:embed="rId2">
-              <a:extLst>
-                <a:ext uri="{28A0092B-C50C-407E-A947-70E740481C1C}">
-                  <a14:useLocalDpi xmlns:a14="http://schemas.microsoft.com/office/drawing/2010/main" val="0"/>
-                </a:ext>
-              </a:extLst>
-            </a:blip>
-            <a:stretch>
-              <a:fillRect/>
-            </a:stretch>
-          </p:blipFill>
-          <p:spPr>
-            <a:xfrm>
-              <a:off x="3352562" y="1045014"/>
-              <a:ext cx="8630164" cy="4854468"/>
-            </a:xfrm>
-            <a:prstGeom prst="rect">
-              <a:avLst/>
-            </a:prstGeom>
-          </p:spPr>
-        </p:pic>
-        <p:pic>
-          <p:nvPicPr>
-            <p:cNvPr id="4" name="图片 3"/>
-            <p:cNvPicPr>
-              <a:picLocks noChangeAspect="1"/>
-            </p:cNvPicPr>
-            <p:nvPr/>
-          </p:nvPicPr>
-          <p:blipFill>
-            <a:blip r:embed="rId2">
-              <a:extLst>
-                <a:ext uri="{28A0092B-C50C-407E-A947-70E740481C1C}">
-                  <a14:useLocalDpi xmlns:a14="http://schemas.microsoft.com/office/drawing/2010/main" val="0"/>
-                </a:ext>
-              </a:extLst>
-            </a:blip>
-            <a:stretch>
-              <a:fillRect/>
-            </a:stretch>
-          </p:blipFill>
-          <p:spPr>
-            <a:xfrm>
-              <a:off x="3504962" y="1197414"/>
-              <a:ext cx="8630164" cy="4854468"/>
-            </a:xfrm>
-            <a:prstGeom prst="rect">
-              <a:avLst/>
-            </a:prstGeom>
-          </p:spPr>
-        </p:pic>
-        <p:pic>
-          <p:nvPicPr>
-            <p:cNvPr id="5" name="图片 4"/>
-            <p:cNvPicPr>
-              <a:picLocks noChangeAspect="1"/>
-            </p:cNvPicPr>
-            <p:nvPr/>
-          </p:nvPicPr>
-          <p:blipFill rotWithShape="1">
-            <a:blip r:embed="rId3">
-              <a:extLst>
-                <a:ext uri="{28A0092B-C50C-407E-A947-70E740481C1C}">
-                  <a14:useLocalDpi xmlns:a14="http://schemas.microsoft.com/office/drawing/2010/main" val="0"/>
-                </a:ext>
-              </a:extLst>
-            </a:blip>
-            <a:srcRect l="1" r="54312" b="65827"/>
-            <a:stretch/>
-          </p:blipFill>
-          <p:spPr>
-            <a:xfrm>
-              <a:off x="-201828" y="295385"/>
-              <a:ext cx="4131276" cy="1738154"/>
-            </a:xfrm>
-            <a:prstGeom prst="rect">
-              <a:avLst/>
-            </a:prstGeom>
-          </p:spPr>
-        </p:pic>
-        <p:pic>
-          <p:nvPicPr>
-            <p:cNvPr id="6" name="图片 5"/>
-            <p:cNvPicPr>
-              <a:picLocks noChangeAspect="1"/>
-            </p:cNvPicPr>
-            <p:nvPr/>
-          </p:nvPicPr>
-          <p:blipFill rotWithShape="1">
-            <a:blip r:embed="rId3">
-              <a:extLst>
-                <a:ext uri="{28A0092B-C50C-407E-A947-70E740481C1C}">
-                  <a14:useLocalDpi xmlns:a14="http://schemas.microsoft.com/office/drawing/2010/main" val="0"/>
-                </a:ext>
-              </a:extLst>
-            </a:blip>
-            <a:srcRect l="9338" t="35874" r="63606" b="21045"/>
-            <a:stretch/>
-          </p:blipFill>
-          <p:spPr>
-            <a:xfrm>
-              <a:off x="640542" y="3232322"/>
-              <a:ext cx="2446536" cy="2191264"/>
-            </a:xfrm>
-            <a:prstGeom prst="rect">
-              <a:avLst/>
-            </a:prstGeom>
-          </p:spPr>
-        </p:pic>
-      </p:grpSp>
+          <a:prstGeom prst="rect">
+            <a:avLst/>
+          </a:prstGeom>
+        </p:spPr>
+      </p:pic>
+      <p:pic>
+        <p:nvPicPr>
+          <p:cNvPr id="9" name="圖片 8">
+            <a:extLst>
+              <a:ext uri="{FF2B5EF4-FFF2-40B4-BE49-F238E27FC236}">
+                <a16:creationId xmlns:a16="http://schemas.microsoft.com/office/drawing/2014/main" id="{4D251A00-554D-9BE6-5273-8634A4FF9956}"/>
+              </a:ext>
+            </a:extLst>
+          </p:cNvPr>
+          <p:cNvPicPr>
+            <a:picLocks noChangeAspect="1"/>
+          </p:cNvPicPr>
+          <p:nvPr/>
+        </p:nvPicPr>
+        <p:blipFill>
+          <a:blip r:embed="rId3"/>
+          <a:stretch>
+            <a:fillRect/>
+          </a:stretch>
+        </p:blipFill>
+        <p:spPr>
+          <a:xfrm>
+            <a:off x="143933" y="1052761"/>
+            <a:ext cx="3620529" cy="736793"/>
+          </a:xfrm>
+          <a:prstGeom prst="rect">
+            <a:avLst/>
+          </a:prstGeom>
+        </p:spPr>
+      </p:pic>
+      <p:pic>
+        <p:nvPicPr>
+          <p:cNvPr id="10" name="圖片 9">
+            <a:extLst>
+              <a:ext uri="{FF2B5EF4-FFF2-40B4-BE49-F238E27FC236}">
+                <a16:creationId xmlns:a16="http://schemas.microsoft.com/office/drawing/2014/main" id="{677BB363-8294-794B-DFFD-54C6E69622B0}"/>
+              </a:ext>
+            </a:extLst>
+          </p:cNvPr>
+          <p:cNvPicPr>
+            <a:picLocks noChangeAspect="1"/>
+          </p:cNvPicPr>
+          <p:nvPr/>
+        </p:nvPicPr>
+        <p:blipFill>
+          <a:blip r:embed="rId4"/>
+          <a:stretch>
+            <a:fillRect/>
+          </a:stretch>
+        </p:blipFill>
+        <p:spPr>
+          <a:xfrm>
+            <a:off x="3764463" y="1061228"/>
+            <a:ext cx="8283604" cy="4975817"/>
+          </a:xfrm>
+          <a:prstGeom prst="rect">
+            <a:avLst/>
+          </a:prstGeom>
+        </p:spPr>
+      </p:pic>
     </p:spTree>
     <p:extLst>
       <p:ext uri="{BB962C8B-B14F-4D97-AF65-F5344CB8AC3E}">

</xml_diff>